<commit_message>
boards: New shields posted.
</commit_message>
<xml_diff>
--- a/boards/poe-shield/poe-shield-pinout.pptx
+++ b/boards/poe-shield/poe-shield-pinout.pptx
@@ -241,7 +241,7 @@
           <a:p>
             <a:fld id="{C4837162-BF4A-4F96-959A-FC5D79B042DC}" type="datetimeFigureOut">
               <a:rPr lang="en-US" smtClean="0"/>
-              <a:t>5/7/2024</a:t>
+              <a:t>1/8/2026</a:t>
             </a:fld>
             <a:endParaRPr lang="en-US"/>
           </a:p>
@@ -409,7 +409,7 @@
           <a:p>
             <a:fld id="{C4837162-BF4A-4F96-959A-FC5D79B042DC}" type="datetimeFigureOut">
               <a:rPr lang="en-US" smtClean="0"/>
-              <a:t>5/7/2024</a:t>
+              <a:t>1/8/2026</a:t>
             </a:fld>
             <a:endParaRPr lang="en-US"/>
           </a:p>
@@ -587,7 +587,7 @@
           <a:p>
             <a:fld id="{C4837162-BF4A-4F96-959A-FC5D79B042DC}" type="datetimeFigureOut">
               <a:rPr lang="en-US" smtClean="0"/>
-              <a:t>5/7/2024</a:t>
+              <a:t>1/8/2026</a:t>
             </a:fld>
             <a:endParaRPr lang="en-US"/>
           </a:p>
@@ -755,7 +755,7 @@
           <a:p>
             <a:fld id="{C4837162-BF4A-4F96-959A-FC5D79B042DC}" type="datetimeFigureOut">
               <a:rPr lang="en-US" smtClean="0"/>
-              <a:t>5/7/2024</a:t>
+              <a:t>1/8/2026</a:t>
             </a:fld>
             <a:endParaRPr lang="en-US"/>
           </a:p>
@@ -1000,7 +1000,7 @@
           <a:p>
             <a:fld id="{C4837162-BF4A-4F96-959A-FC5D79B042DC}" type="datetimeFigureOut">
               <a:rPr lang="en-US" smtClean="0"/>
-              <a:t>5/7/2024</a:t>
+              <a:t>1/8/2026</a:t>
             </a:fld>
             <a:endParaRPr lang="en-US"/>
           </a:p>
@@ -1229,7 +1229,7 @@
           <a:p>
             <a:fld id="{C4837162-BF4A-4F96-959A-FC5D79B042DC}" type="datetimeFigureOut">
               <a:rPr lang="en-US" smtClean="0"/>
-              <a:t>5/7/2024</a:t>
+              <a:t>1/8/2026</a:t>
             </a:fld>
             <a:endParaRPr lang="en-US"/>
           </a:p>
@@ -1593,7 +1593,7 @@
           <a:p>
             <a:fld id="{C4837162-BF4A-4F96-959A-FC5D79B042DC}" type="datetimeFigureOut">
               <a:rPr lang="en-US" smtClean="0"/>
-              <a:t>5/7/2024</a:t>
+              <a:t>1/8/2026</a:t>
             </a:fld>
             <a:endParaRPr lang="en-US"/>
           </a:p>
@@ -1710,7 +1710,7 @@
           <a:p>
             <a:fld id="{C4837162-BF4A-4F96-959A-FC5D79B042DC}" type="datetimeFigureOut">
               <a:rPr lang="en-US" smtClean="0"/>
-              <a:t>5/7/2024</a:t>
+              <a:t>1/8/2026</a:t>
             </a:fld>
             <a:endParaRPr lang="en-US"/>
           </a:p>
@@ -1805,7 +1805,7 @@
           <a:p>
             <a:fld id="{C4837162-BF4A-4F96-959A-FC5D79B042DC}" type="datetimeFigureOut">
               <a:rPr lang="en-US" smtClean="0"/>
-              <a:t>5/7/2024</a:t>
+              <a:t>1/8/2026</a:t>
             </a:fld>
             <a:endParaRPr lang="en-US"/>
           </a:p>
@@ -2080,7 +2080,7 @@
           <a:p>
             <a:fld id="{C4837162-BF4A-4F96-959A-FC5D79B042DC}" type="datetimeFigureOut">
               <a:rPr lang="en-US" smtClean="0"/>
-              <a:t>5/7/2024</a:t>
+              <a:t>1/8/2026</a:t>
             </a:fld>
             <a:endParaRPr lang="en-US"/>
           </a:p>
@@ -2332,7 +2332,7 @@
           <a:p>
             <a:fld id="{C4837162-BF4A-4F96-959A-FC5D79B042DC}" type="datetimeFigureOut">
               <a:rPr lang="en-US" smtClean="0"/>
-              <a:t>5/7/2024</a:t>
+              <a:t>1/8/2026</a:t>
             </a:fld>
             <a:endParaRPr lang="en-US"/>
           </a:p>
@@ -2543,7 +2543,7 @@
           <a:p>
             <a:fld id="{C4837162-BF4A-4F96-959A-FC5D79B042DC}" type="datetimeFigureOut">
               <a:rPr lang="en-US" smtClean="0"/>
-              <a:t>5/7/2024</a:t>
+              <a:t>1/8/2026</a:t>
             </a:fld>
             <a:endParaRPr lang="en-US"/>
           </a:p>
@@ -2983,7 +2983,9 @@
             <p:nvPr/>
           </p:nvPicPr>
           <p:blipFill>
-            <a:blip r:embed="rId2"/>
+            <a:blip r:embed="rId2">
+              <a:alphaModFix amt="50000"/>
+            </a:blip>
             <a:stretch>
               <a:fillRect/>
             </a:stretch>
@@ -5342,7 +5344,7 @@
                   <a:pPr algn="ctr"/>
                   <a:r>
                     <a:rPr lang="en-US" sz="1400" dirty="0"/>
-                    <a:t>VIN Out (5.4V @ 1.2A)</a:t>
+                    <a:t>VIN Out (5.4V @ ~1A)</a:t>
                   </a:r>
                 </a:p>
               </p:txBody>

</xml_diff>